<commit_message>
Added libs to R code
</commit_message>
<xml_diff>
--- a/analysis/figures/2023_07_31_plots_for_paper.pptx
+++ b/analysis/figures/2023_07_31_plots_for_paper.pptx
@@ -257,7 +257,7 @@
           <a:p>
             <a:fld id="{F96C78E7-D2FD-4CE9-9319-43DA8F4B39C6}" type="datetimeFigureOut">
               <a:rPr lang="he-IL" smtClean="0"/>
-              <a:t>ט"ו/אב/תשפ"ג</a:t>
+              <a:t>כ'/אב/תשפ"ג</a:t>
             </a:fld>
             <a:endParaRPr lang="he-IL"/>
           </a:p>
@@ -427,7 +427,7 @@
           <a:p>
             <a:fld id="{F96C78E7-D2FD-4CE9-9319-43DA8F4B39C6}" type="datetimeFigureOut">
               <a:rPr lang="he-IL" smtClean="0"/>
-              <a:t>ט"ו/אב/תשפ"ג</a:t>
+              <a:t>כ'/אב/תשפ"ג</a:t>
             </a:fld>
             <a:endParaRPr lang="he-IL"/>
           </a:p>
@@ -607,7 +607,7 @@
           <a:p>
             <a:fld id="{F96C78E7-D2FD-4CE9-9319-43DA8F4B39C6}" type="datetimeFigureOut">
               <a:rPr lang="he-IL" smtClean="0"/>
-              <a:t>ט"ו/אב/תשפ"ג</a:t>
+              <a:t>כ'/אב/תשפ"ג</a:t>
             </a:fld>
             <a:endParaRPr lang="he-IL"/>
           </a:p>
@@ -777,7 +777,7 @@
           <a:p>
             <a:fld id="{F96C78E7-D2FD-4CE9-9319-43DA8F4B39C6}" type="datetimeFigureOut">
               <a:rPr lang="he-IL" smtClean="0"/>
-              <a:t>ט"ו/אב/תשפ"ג</a:t>
+              <a:t>כ'/אב/תשפ"ג</a:t>
             </a:fld>
             <a:endParaRPr lang="he-IL"/>
           </a:p>
@@ -1021,7 +1021,7 @@
           <a:p>
             <a:fld id="{F96C78E7-D2FD-4CE9-9319-43DA8F4B39C6}" type="datetimeFigureOut">
               <a:rPr lang="he-IL" smtClean="0"/>
-              <a:t>ט"ו/אב/תשפ"ג</a:t>
+              <a:t>כ'/אב/תשפ"ג</a:t>
             </a:fld>
             <a:endParaRPr lang="he-IL"/>
           </a:p>
@@ -1253,7 +1253,7 @@
           <a:p>
             <a:fld id="{F96C78E7-D2FD-4CE9-9319-43DA8F4B39C6}" type="datetimeFigureOut">
               <a:rPr lang="he-IL" smtClean="0"/>
-              <a:t>ט"ו/אב/תשפ"ג</a:t>
+              <a:t>כ'/אב/תשפ"ג</a:t>
             </a:fld>
             <a:endParaRPr lang="he-IL"/>
           </a:p>
@@ -1620,7 +1620,7 @@
           <a:p>
             <a:fld id="{F96C78E7-D2FD-4CE9-9319-43DA8F4B39C6}" type="datetimeFigureOut">
               <a:rPr lang="he-IL" smtClean="0"/>
-              <a:t>ט"ו/אב/תשפ"ג</a:t>
+              <a:t>כ'/אב/תשפ"ג</a:t>
             </a:fld>
             <a:endParaRPr lang="he-IL"/>
           </a:p>
@@ -1738,7 +1738,7 @@
           <a:p>
             <a:fld id="{F96C78E7-D2FD-4CE9-9319-43DA8F4B39C6}" type="datetimeFigureOut">
               <a:rPr lang="he-IL" smtClean="0"/>
-              <a:t>ט"ו/אב/תשפ"ג</a:t>
+              <a:t>כ'/אב/תשפ"ג</a:t>
             </a:fld>
             <a:endParaRPr lang="he-IL"/>
           </a:p>
@@ -1833,7 +1833,7 @@
           <a:p>
             <a:fld id="{F96C78E7-D2FD-4CE9-9319-43DA8F4B39C6}" type="datetimeFigureOut">
               <a:rPr lang="he-IL" smtClean="0"/>
-              <a:t>ט"ו/אב/תשפ"ג</a:t>
+              <a:t>כ'/אב/תשפ"ג</a:t>
             </a:fld>
             <a:endParaRPr lang="he-IL"/>
           </a:p>
@@ -2110,7 +2110,7 @@
           <a:p>
             <a:fld id="{F96C78E7-D2FD-4CE9-9319-43DA8F4B39C6}" type="datetimeFigureOut">
               <a:rPr lang="he-IL" smtClean="0"/>
-              <a:t>ט"ו/אב/תשפ"ג</a:t>
+              <a:t>כ'/אב/תשפ"ג</a:t>
             </a:fld>
             <a:endParaRPr lang="he-IL"/>
           </a:p>
@@ -2367,7 +2367,7 @@
           <a:p>
             <a:fld id="{F96C78E7-D2FD-4CE9-9319-43DA8F4B39C6}" type="datetimeFigureOut">
               <a:rPr lang="he-IL" smtClean="0"/>
-              <a:t>ט"ו/אב/תשפ"ג</a:t>
+              <a:t>כ'/אב/תשפ"ג</a:t>
             </a:fld>
             <a:endParaRPr lang="he-IL"/>
           </a:p>
@@ -2580,7 +2580,7 @@
           <a:p>
             <a:fld id="{F96C78E7-D2FD-4CE9-9319-43DA8F4B39C6}" type="datetimeFigureOut">
               <a:rPr lang="he-IL" smtClean="0"/>
-              <a:t>ט"ו/אב/תשפ"ג</a:t>
+              <a:t>כ'/אב/תשפ"ג</a:t>
             </a:fld>
             <a:endParaRPr lang="he-IL"/>
           </a:p>
@@ -4705,7 +4705,7 @@
             <a:pPr algn="ctr"/>
             <a:r>
               <a:rPr lang="en-US" sz="900" b="1" dirty="0"/>
-              <a:t>(d)</a:t>
+              <a:t>(h)</a:t>
             </a:r>
             <a:endParaRPr lang="he-IL" sz="900" b="1" dirty="0"/>
           </a:p>

</xml_diff>